<commit_message>
Update Speech to text to input.pptx
</commit_message>
<xml_diff>
--- a/Portfolio/Speech to text to input.pptx
+++ b/Portfolio/Speech to text to input.pptx
@@ -10,7 +10,8 @@
     <p:sldId id="258" r:id="rId4"/>
     <p:sldId id="259" r:id="rId5"/>
     <p:sldId id="261" r:id="rId6"/>
-    <p:sldId id="260" r:id="rId7"/>
+    <p:sldId id="262" r:id="rId7"/>
+    <p:sldId id="260" r:id="rId8"/>
   </p:sldIdLst>
   <p:sldSz cx="12192000" cy="6858000"/>
   <p:notesSz cx="6858000" cy="9144000"/>
@@ -449,7 +450,7 @@
             <a:fld id="{B61BEF0D-F0BB-DE4B-95CE-6DB70DBA9567}" type="datetimeFigureOut">
               <a:rPr lang="en-US" dirty="0"/>
               <a:pPr/>
-              <a:t>6/21/2019</a:t>
+              <a:t>6/30/2019</a:t>
             </a:fld>
             <a:endParaRPr lang="en-US" dirty="0"/>
           </a:p>
@@ -770,7 +771,7 @@
             <a:fld id="{B61BEF0D-F0BB-DE4B-95CE-6DB70DBA9567}" type="datetimeFigureOut">
               <a:rPr lang="en-US" dirty="0"/>
               <a:pPr/>
-              <a:t>6/21/2019</a:t>
+              <a:t>6/30/2019</a:t>
             </a:fld>
             <a:endParaRPr lang="en-US" dirty="0"/>
           </a:p>
@@ -1015,7 +1016,7 @@
             <a:fld id="{B61BEF0D-F0BB-DE4B-95CE-6DB70DBA9567}" type="datetimeFigureOut">
               <a:rPr lang="en-US" dirty="0"/>
               <a:pPr/>
-              <a:t>6/21/2019</a:t>
+              <a:t>6/30/2019</a:t>
             </a:fld>
             <a:endParaRPr lang="en-US" dirty="0"/>
           </a:p>
@@ -1351,7 +1352,7 @@
             <a:fld id="{B61BEF0D-F0BB-DE4B-95CE-6DB70DBA9567}" type="datetimeFigureOut">
               <a:rPr lang="en-US" dirty="0"/>
               <a:pPr/>
-              <a:t>6/21/2019</a:t>
+              <a:t>6/30/2019</a:t>
             </a:fld>
             <a:endParaRPr lang="en-US" dirty="0"/>
           </a:p>
@@ -1695,7 +1696,7 @@
             <a:fld id="{B61BEF0D-F0BB-DE4B-95CE-6DB70DBA9567}" type="datetimeFigureOut">
               <a:rPr lang="en-US" dirty="0"/>
               <a:pPr/>
-              <a:t>6/21/2019</a:t>
+              <a:t>6/30/2019</a:t>
             </a:fld>
             <a:endParaRPr lang="en-US" dirty="0"/>
           </a:p>
@@ -2066,7 +2067,7 @@
             <a:fld id="{B61BEF0D-F0BB-DE4B-95CE-6DB70DBA9567}" type="datetimeFigureOut">
               <a:rPr lang="en-US" dirty="0"/>
               <a:pPr/>
-              <a:t>6/21/2019</a:t>
+              <a:t>6/30/2019</a:t>
             </a:fld>
             <a:endParaRPr lang="en-US" dirty="0"/>
           </a:p>
@@ -2533,7 +2534,7 @@
             <a:fld id="{B61BEF0D-F0BB-DE4B-95CE-6DB70DBA9567}" type="datetimeFigureOut">
               <a:rPr lang="en-US" dirty="0"/>
               <a:pPr/>
-              <a:t>6/21/2019</a:t>
+              <a:t>6/30/2019</a:t>
             </a:fld>
             <a:endParaRPr lang="en-US" dirty="0"/>
           </a:p>
@@ -2735,7 +2736,7 @@
             <a:fld id="{B61BEF0D-F0BB-DE4B-95CE-6DB70DBA9567}" type="datetimeFigureOut">
               <a:rPr lang="en-US" dirty="0"/>
               <a:pPr/>
-              <a:t>6/21/2019</a:t>
+              <a:t>6/30/2019</a:t>
             </a:fld>
             <a:endParaRPr lang="en-US" dirty="0"/>
           </a:p>
@@ -2943,7 +2944,7 @@
             <a:fld id="{B61BEF0D-F0BB-DE4B-95CE-6DB70DBA9567}" type="datetimeFigureOut">
               <a:rPr lang="en-US" dirty="0"/>
               <a:pPr/>
-              <a:t>6/21/2019</a:t>
+              <a:t>6/30/2019</a:t>
             </a:fld>
             <a:endParaRPr lang="en-US" dirty="0"/>
           </a:p>
@@ -3171,7 +3172,7 @@
           <a:p>
             <a:fld id="{05BFA754-D5C3-4E66-96A6-867B257F58DC}" type="datetimeFigureOut">
               <a:rPr lang="en-US" dirty="0"/>
-              <a:t>6/21/2019</a:t>
+              <a:t>6/30/2019</a:t>
             </a:fld>
             <a:endParaRPr lang="en-US" dirty="0"/>
           </a:p>
@@ -3415,7 +3416,7 @@
             <a:fld id="{B61BEF0D-F0BB-DE4B-95CE-6DB70DBA9567}" type="datetimeFigureOut">
               <a:rPr lang="en-US" dirty="0"/>
               <a:pPr/>
-              <a:t>6/21/2019</a:t>
+              <a:t>6/30/2019</a:t>
             </a:fld>
             <a:endParaRPr lang="en-US" dirty="0"/>
           </a:p>
@@ -3678,7 +3679,7 @@
           <a:p>
             <a:fld id="{05BFA754-D5C3-4E66-96A6-867B257F58DC}" type="datetimeFigureOut">
               <a:rPr lang="en-US" dirty="0"/>
-              <a:t>6/21/2019</a:t>
+              <a:t>6/30/2019</a:t>
             </a:fld>
             <a:endParaRPr lang="en-US" dirty="0"/>
           </a:p>
@@ -4087,7 +4088,7 @@
             <a:fld id="{B61BEF0D-F0BB-DE4B-95CE-6DB70DBA9567}" type="datetimeFigureOut">
               <a:rPr lang="en-US" dirty="0"/>
               <a:pPr/>
-              <a:t>6/21/2019</a:t>
+              <a:t>6/30/2019</a:t>
             </a:fld>
             <a:endParaRPr lang="en-US" dirty="0"/>
           </a:p>
@@ -4233,7 +4234,7 @@
             <a:fld id="{B61BEF0D-F0BB-DE4B-95CE-6DB70DBA9567}" type="datetimeFigureOut">
               <a:rPr lang="en-US" dirty="0"/>
               <a:pPr/>
-              <a:t>6/21/2019</a:t>
+              <a:t>6/30/2019</a:t>
             </a:fld>
             <a:endParaRPr lang="en-US" dirty="0"/>
           </a:p>
@@ -4356,7 +4357,7 @@
             <a:fld id="{B61BEF0D-F0BB-DE4B-95CE-6DB70DBA9567}" type="datetimeFigureOut">
               <a:rPr lang="en-US" dirty="0"/>
               <a:pPr/>
-              <a:t>6/21/2019</a:t>
+              <a:t>6/30/2019</a:t>
             </a:fld>
             <a:endParaRPr lang="en-US" dirty="0"/>
           </a:p>
@@ -4608,7 +4609,7 @@
             <a:fld id="{B61BEF0D-F0BB-DE4B-95CE-6DB70DBA9567}" type="datetimeFigureOut">
               <a:rPr lang="en-US" dirty="0"/>
               <a:pPr/>
-              <a:t>6/21/2019</a:t>
+              <a:t>6/30/2019</a:t>
             </a:fld>
             <a:endParaRPr lang="en-US" dirty="0"/>
           </a:p>
@@ -4920,7 +4921,7 @@
             <a:fld id="{B61BEF0D-F0BB-DE4B-95CE-6DB70DBA9567}" type="datetimeFigureOut">
               <a:rPr lang="en-US" dirty="0"/>
               <a:pPr/>
-              <a:t>6/21/2019</a:t>
+              <a:t>6/30/2019</a:t>
             </a:fld>
             <a:endParaRPr lang="en-US" dirty="0"/>
           </a:p>
@@ -5268,7 +5269,7 @@
             <a:fld id="{B61BEF0D-F0BB-DE4B-95CE-6DB70DBA9567}" type="datetimeFigureOut">
               <a:rPr lang="en-US" dirty="0"/>
               <a:pPr/>
-              <a:t>6/21/2019</a:t>
+              <a:t>6/30/2019</a:t>
             </a:fld>
             <a:endParaRPr lang="en-US" dirty="0"/>
           </a:p>
@@ -6377,6 +6378,98 @@
 <file path=ppt/slides/slide6.xml><?xml version="1.0" encoding="utf-8"?>
 <p:sld xmlns:a="http://schemas.openxmlformats.org/drawingml/2006/main" xmlns:r="http://schemas.openxmlformats.org/officeDocument/2006/relationships" xmlns:p="http://schemas.openxmlformats.org/presentationml/2006/main">
   <p:cSld>
+    <p:spTree>
+      <p:nvGrpSpPr>
+        <p:cNvPr id="1" name=""/>
+        <p:cNvGrpSpPr/>
+        <p:nvPr/>
+      </p:nvGrpSpPr>
+      <p:grpSpPr>
+        <a:xfrm>
+          <a:off x="0" y="0"/>
+          <a:ext cx="0" cy="0"/>
+          <a:chOff x="0" y="0"/>
+          <a:chExt cx="0" cy="0"/>
+        </a:xfrm>
+      </p:grpSpPr>
+      <p:sp>
+        <p:nvSpPr>
+          <p:cNvPr id="2" name="Titel 1">
+            <a:extLst>
+              <a:ext uri="{FF2B5EF4-FFF2-40B4-BE49-F238E27FC236}">
+                <a16:creationId xmlns:a16="http://schemas.microsoft.com/office/drawing/2014/main" id="{2F31C221-A3B0-4756-9398-556CA92FAB52}"/>
+              </a:ext>
+            </a:extLst>
+          </p:cNvPr>
+          <p:cNvSpPr>
+            <a:spLocks noGrp="1"/>
+          </p:cNvSpPr>
+          <p:nvPr>
+            <p:ph type="title"/>
+          </p:nvPr>
+        </p:nvSpPr>
+        <p:spPr/>
+        <p:txBody>
+          <a:bodyPr/>
+          <a:lstStyle/>
+          <a:p>
+            <a:r>
+              <a:rPr lang="nl-NL" dirty="0"/>
+              <a:t>Test</a:t>
+            </a:r>
+          </a:p>
+        </p:txBody>
+      </p:sp>
+      <p:sp>
+        <p:nvSpPr>
+          <p:cNvPr id="3" name="Tijdelijke aanduiding voor inhoud 2">
+            <a:extLst>
+              <a:ext uri="{FF2B5EF4-FFF2-40B4-BE49-F238E27FC236}">
+                <a16:creationId xmlns:a16="http://schemas.microsoft.com/office/drawing/2014/main" id="{D4CB5A6B-7EB2-479C-B804-EB80023FCC3F}"/>
+              </a:ext>
+            </a:extLst>
+          </p:cNvPr>
+          <p:cNvSpPr>
+            <a:spLocks noGrp="1"/>
+          </p:cNvSpPr>
+          <p:nvPr>
+            <p:ph idx="1"/>
+          </p:nvPr>
+        </p:nvSpPr>
+        <p:spPr/>
+        <p:txBody>
+          <a:bodyPr/>
+          <a:lstStyle/>
+          <a:p>
+            <a:r>
+              <a:rPr lang="nl-NL" dirty="0"/>
+              <a:t>Aantal</a:t>
+            </a:r>
+          </a:p>
+          <a:p>
+            <a:r>
+              <a:rPr lang="nl-NL" dirty="0"/>
+              <a:t>Feedback</a:t>
+            </a:r>
+          </a:p>
+        </p:txBody>
+      </p:sp>
+    </p:spTree>
+    <p:extLst>
+      <p:ext uri="{BB962C8B-B14F-4D97-AF65-F5344CB8AC3E}">
+        <p14:creationId xmlns:p14="http://schemas.microsoft.com/office/powerpoint/2010/main" val="1543152591"/>
+      </p:ext>
+    </p:extLst>
+  </p:cSld>
+  <p:clrMapOvr>
+    <a:masterClrMapping/>
+  </p:clrMapOvr>
+</p:sld>
+</file>
+
+<file path=ppt/slides/slide7.xml><?xml version="1.0" encoding="utf-8"?>
+<p:sld xmlns:a="http://schemas.openxmlformats.org/drawingml/2006/main" xmlns:r="http://schemas.openxmlformats.org/officeDocument/2006/relationships" xmlns:p="http://schemas.openxmlformats.org/presentationml/2006/main">
+  <p:cSld>
     <p:bg>
       <p:bgPr>
         <a:blipFill>

</xml_diff>